<commit_message>
Representation changes and functionality fixes: * Change representation of gdp_recno_t to be 64 bits. * Replace tt_interval with EP_TIME_SPEC. * Augment EP_TIME_SPEC to have a floating-point tv_accuracy field and   pack the structure to keep the whole thing to 16 bytes. * Initialize all of the header fields in gdpd_physlog.c when opening an   existing GCL.
</commit_message>
<xml_diff>
--- a/doc/gdp-internals-v0.pptx
+++ b/doc/gdp-internals-v0.pptx
@@ -6556,7 +6556,15 @@
                   <a:srgbClr val="0000FF"/>
                 </a:solidFill>
               </a:rPr>
-              <a:t>Link new event to active queue</a:t>
+              <a:t>Link new event to </a:t>
+            </a:r>
+            <a:r>
+              <a:rPr lang="en-US" sz="1400" smtClean="0">
+                <a:solidFill>
+                  <a:srgbClr val="0000FF"/>
+                </a:solidFill>
+              </a:rPr>
+              <a:t>active event queue</a:t>
             </a:r>
             <a:endParaRPr lang="en-US" sz="1400" dirty="0">
               <a:solidFill>

</xml_diff>